<commit_message>
Put presentation inside the deliverable
</commit_message>
<xml_diff>
--- a/Project/presentation/AI_present.pptx
+++ b/Project/presentation/AI_present.pptx
@@ -222,7 +222,7 @@
             <a:fld id="{E7D082E9-C99F-4C4B-B309-F4F0D8F07CF4}" type="datetimeFigureOut">
               <a:rPr lang="el-GR" smtClean="0"/>
               <a:pPr/>
-              <a:t>27/5/2018</a:t>
+              <a:t>30/5/2018</a:t>
             </a:fld>
             <a:endParaRPr lang="el-GR"/>
           </a:p>
@@ -4491,14 +4491,34 @@
           </a:p>
           <a:p>
             <a:r>
-              <a:rPr lang="el-GR" sz="2900" dirty="0" smtClean="0">
+              <a:rPr lang="en-US" sz="2900" dirty="0">
                 <a:solidFill>
                   <a:schemeClr val="tx1"/>
                 </a:solidFill>
                 <a:latin typeface="Arial" pitchFamily="34" charset="0"/>
                 <a:cs typeface="Arial" pitchFamily="34" charset="0"/>
               </a:rPr>
-              <a:t>10 Ιουνίου 2018</a:t>
+              <a:t>9</a:t>
+            </a:r>
+            <a:r>
+              <a:rPr lang="el-GR" sz="2900" dirty="0" smtClean="0">
+                <a:solidFill>
+                  <a:schemeClr val="tx1"/>
+                </a:solidFill>
+                <a:latin typeface="Arial" pitchFamily="34" charset="0"/>
+                <a:cs typeface="Arial" pitchFamily="34" charset="0"/>
+              </a:rPr>
+              <a:t> </a:t>
+            </a:r>
+            <a:r>
+              <a:rPr lang="el-GR" sz="2900" dirty="0" smtClean="0">
+                <a:solidFill>
+                  <a:schemeClr val="tx1"/>
+                </a:solidFill>
+                <a:latin typeface="Arial" pitchFamily="34" charset="0"/>
+                <a:cs typeface="Arial" pitchFamily="34" charset="0"/>
+              </a:rPr>
+              <a:t>Ιουνίου 2018</a:t>
             </a:r>
             <a:endParaRPr lang="en-US" sz="2900" dirty="0" smtClean="0">
               <a:solidFill>
@@ -6907,7 +6927,6 @@
               <a:rPr lang="en-US" dirty="0"/>
               <a:t>0</a:t>
             </a:r>
-            <a:endParaRPr lang="en-US" dirty="0"/>
           </a:p>
         </p:txBody>
       </p:sp>
@@ -6937,7 +6956,6 @@
               <a:rPr lang="en-US" dirty="0"/>
               <a:t>0</a:t>
             </a:r>
-            <a:endParaRPr lang="en-US" dirty="0"/>
           </a:p>
         </p:txBody>
       </p:sp>
@@ -6967,7 +6985,6 @@
               <a:rPr lang="en-US" dirty="0"/>
               <a:t>0</a:t>
             </a:r>
-            <a:endParaRPr lang="en-US" dirty="0"/>
           </a:p>
         </p:txBody>
       </p:sp>
@@ -7057,7 +7074,6 @@
               <a:rPr lang="en-US" dirty="0"/>
               <a:t>0</a:t>
             </a:r>
-            <a:endParaRPr lang="en-US" dirty="0"/>
           </a:p>
         </p:txBody>
       </p:sp>
@@ -7117,7 +7133,6 @@
               <a:rPr lang="en-US" dirty="0"/>
               <a:t>0</a:t>
             </a:r>
-            <a:endParaRPr lang="en-US" dirty="0"/>
           </a:p>
         </p:txBody>
       </p:sp>
@@ -7237,7 +7252,6 @@
               <a:rPr lang="en-US" dirty="0"/>
               <a:t>0</a:t>
             </a:r>
-            <a:endParaRPr lang="en-US" dirty="0"/>
           </a:p>
         </p:txBody>
       </p:sp>

</xml_diff>

<commit_message>
Added comments to slides
</commit_message>
<xml_diff>
--- a/Project/presentation/AI_present.pptx
+++ b/Project/presentation/AI_present.pptx
@@ -222,7 +222,7 @@
             <a:fld id="{E7D082E9-C99F-4C4B-B309-F4F0D8F07CF4}" type="datetimeFigureOut">
               <a:rPr lang="el-GR" smtClean="0"/>
               <a:pPr/>
-              <a:t>30/5/2018</a:t>
+              <a:t>8/6/2018</a:t>
             </a:fld>
             <a:endParaRPr lang="el-GR"/>
           </a:p>
@@ -535,6 +535,18 @@
           <a:bodyPr/>
           <a:lstStyle/>
           <a:p>
+            <a:r>
+              <a:rPr lang="el-GR" dirty="0" smtClean="0"/>
+              <a:t>Γεια σας, είμαστε ο Μιχάλης και ο Γιάννης και σας παρουσιάζουμε τις</a:t>
+            </a:r>
+            <a:r>
+              <a:rPr lang="el-GR" baseline="0" dirty="0" smtClean="0"/>
+              <a:t> υλοποιήσεις μας σε </a:t>
+            </a:r>
+            <a:r>
+              <a:rPr lang="en-US" baseline="0" dirty="0" smtClean="0"/>
+              <a:t>matlab.</a:t>
+            </a:r>
             <a:endParaRPr lang="en-US" dirty="0"/>
           </a:p>
         </p:txBody>
@@ -575,6 +587,1087 @@
     <p:extLst>
       <p:ext uri="{BB962C8B-B14F-4D97-AF65-F5344CB8AC3E}">
         <p14:creationId xmlns:p14="http://schemas.microsoft.com/office/powerpoint/2010/main" val="2202116494"/>
+      </p:ext>
+    </p:extLst>
+  </p:cSld>
+  <p:clrMapOvr>
+    <a:masterClrMapping/>
+  </p:clrMapOvr>
+</p:notes>
+</file>
+
+<file path=ppt/notesSlides/notesSlide10.xml><?xml version="1.0" encoding="utf-8"?>
+<p:notes xmlns:a="http://schemas.openxmlformats.org/drawingml/2006/main" xmlns:r="http://schemas.openxmlformats.org/officeDocument/2006/relationships" xmlns:p="http://schemas.openxmlformats.org/presentationml/2006/main">
+  <p:cSld>
+    <p:spTree>
+      <p:nvGrpSpPr>
+        <p:cNvPr id="1" name=""/>
+        <p:cNvGrpSpPr/>
+        <p:nvPr/>
+      </p:nvGrpSpPr>
+      <p:grpSpPr>
+        <a:xfrm>
+          <a:off x="0" y="0"/>
+          <a:ext cx="0" cy="0"/>
+          <a:chOff x="0" y="0"/>
+          <a:chExt cx="0" cy="0"/>
+        </a:xfrm>
+      </p:grpSpPr>
+      <p:sp>
+        <p:nvSpPr>
+          <p:cNvPr id="2" name="Slide Image Placeholder 1"/>
+          <p:cNvSpPr>
+            <a:spLocks noGrp="1" noRot="1" noChangeAspect="1"/>
+          </p:cNvSpPr>
+          <p:nvPr>
+            <p:ph type="sldImg"/>
+          </p:nvPr>
+        </p:nvSpPr>
+        <p:spPr/>
+      </p:sp>
+      <p:sp>
+        <p:nvSpPr>
+          <p:cNvPr id="3" name="Notes Placeholder 2"/>
+          <p:cNvSpPr>
+            <a:spLocks noGrp="1"/>
+          </p:cNvSpPr>
+          <p:nvPr>
+            <p:ph type="body" idx="1"/>
+          </p:nvPr>
+        </p:nvSpPr>
+        <p:spPr/>
+        <p:txBody>
+          <a:bodyPr/>
+          <a:lstStyle/>
+          <a:p>
+            <a:r>
+              <a:rPr lang="el-GR" dirty="0" smtClean="0"/>
+              <a:t>Τέλος εκτιμήσαμε και</a:t>
+            </a:r>
+            <a:r>
+              <a:rPr lang="el-GR" baseline="0" dirty="0" smtClean="0"/>
+              <a:t> </a:t>
+            </a:r>
+            <a:r>
+              <a:rPr lang="el-GR" dirty="0" smtClean="0"/>
+              <a:t>τη χωρική πολυπλοκότητά</a:t>
+            </a:r>
+            <a:r>
+              <a:rPr lang="el-GR" baseline="0" dirty="0" smtClean="0"/>
+              <a:t> τους, όπου και ο </a:t>
+            </a:r>
+            <a:r>
+              <a:rPr lang="en-US" baseline="0" dirty="0" smtClean="0"/>
+              <a:t>FC-MRV </a:t>
+            </a:r>
+            <a:r>
+              <a:rPr lang="el-GR" baseline="0" dirty="0" smtClean="0"/>
+              <a:t>έδειξε ξανά εκθετική συμπεριφορά λόγω των αναδρομικών κλήσεων. Αντίθετα στην τοπική αναζήτηση όπως περιμέναμε έχουν απλά γραμμικό κόστος.</a:t>
+            </a:r>
+            <a:endParaRPr lang="en-US" dirty="0"/>
+          </a:p>
+        </p:txBody>
+      </p:sp>
+      <p:sp>
+        <p:nvSpPr>
+          <p:cNvPr id="4" name="Slide Number Placeholder 3"/>
+          <p:cNvSpPr>
+            <a:spLocks noGrp="1"/>
+          </p:cNvSpPr>
+          <p:nvPr>
+            <p:ph type="sldNum" sz="quarter" idx="10"/>
+          </p:nvPr>
+        </p:nvSpPr>
+        <p:spPr/>
+        <p:txBody>
+          <a:bodyPr/>
+          <a:lstStyle/>
+          <a:p>
+            <a:fld id="{E4B57389-7FB2-44B0-8AF4-F8530648CB92}" type="slidenum">
+              <a:rPr lang="el-GR" smtClean="0"/>
+              <a:pPr/>
+              <a:t>12</a:t>
+            </a:fld>
+            <a:endParaRPr lang="el-GR"/>
+          </a:p>
+        </p:txBody>
+      </p:sp>
+    </p:spTree>
+    <p:extLst>
+      <p:ext uri="{BB962C8B-B14F-4D97-AF65-F5344CB8AC3E}">
+        <p14:creationId xmlns:p14="http://schemas.microsoft.com/office/powerpoint/2010/main" val="858836908"/>
+      </p:ext>
+    </p:extLst>
+  </p:cSld>
+  <p:clrMapOvr>
+    <a:masterClrMapping/>
+  </p:clrMapOvr>
+</p:notes>
+</file>
+
+<file path=ppt/notesSlides/notesSlide11.xml><?xml version="1.0" encoding="utf-8"?>
+<p:notes xmlns:a="http://schemas.openxmlformats.org/drawingml/2006/main" xmlns:r="http://schemas.openxmlformats.org/officeDocument/2006/relationships" xmlns:p="http://schemas.openxmlformats.org/presentationml/2006/main">
+  <p:cSld>
+    <p:spTree>
+      <p:nvGrpSpPr>
+        <p:cNvPr id="1" name=""/>
+        <p:cNvGrpSpPr/>
+        <p:nvPr/>
+      </p:nvGrpSpPr>
+      <p:grpSpPr>
+        <a:xfrm>
+          <a:off x="0" y="0"/>
+          <a:ext cx="0" cy="0"/>
+          <a:chOff x="0" y="0"/>
+          <a:chExt cx="0" cy="0"/>
+        </a:xfrm>
+      </p:grpSpPr>
+      <p:sp>
+        <p:nvSpPr>
+          <p:cNvPr id="2" name="Slide Image Placeholder 1"/>
+          <p:cNvSpPr>
+            <a:spLocks noGrp="1" noRot="1" noChangeAspect="1"/>
+          </p:cNvSpPr>
+          <p:nvPr>
+            <p:ph type="sldImg"/>
+          </p:nvPr>
+        </p:nvSpPr>
+        <p:spPr/>
+      </p:sp>
+      <p:sp>
+        <p:nvSpPr>
+          <p:cNvPr id="3" name="Notes Placeholder 2"/>
+          <p:cNvSpPr>
+            <a:spLocks noGrp="1"/>
+          </p:cNvSpPr>
+          <p:nvPr>
+            <p:ph type="body" idx="1"/>
+          </p:nvPr>
+        </p:nvSpPr>
+        <p:spPr/>
+        <p:txBody>
+          <a:bodyPr/>
+          <a:lstStyle/>
+          <a:p>
+            <a:r>
+              <a:rPr lang="el-GR" dirty="0" smtClean="0"/>
+              <a:t>Συμπερασματικά λοιπόν</a:t>
+            </a:r>
+            <a:r>
+              <a:rPr lang="el-GR" baseline="0" dirty="0" smtClean="0"/>
+              <a:t> καταλήγουμε ότι οι μέθοδοι τοπικής αναζήτησης είναι πολύ αποδοτικότεροι σε σύγκριση με μεθόδους στηριγμένους σε </a:t>
+            </a:r>
+            <a:r>
+              <a:rPr lang="en-US" baseline="0" dirty="0" smtClean="0"/>
+              <a:t>Backtracking</a:t>
+            </a:r>
+            <a:r>
+              <a:rPr lang="el-GR" baseline="0" dirty="0" smtClean="0"/>
+              <a:t>, ενώ και η τοπική αναζήτηση βελτιώθηκε με βελτίωση της συναρτήσης διαδόχων που εξασφάλισε συγκρούσεις μόνο στις διαγωνίσους.</a:t>
+            </a:r>
+          </a:p>
+        </p:txBody>
+      </p:sp>
+      <p:sp>
+        <p:nvSpPr>
+          <p:cNvPr id="4" name="Slide Number Placeholder 3"/>
+          <p:cNvSpPr>
+            <a:spLocks noGrp="1"/>
+          </p:cNvSpPr>
+          <p:nvPr>
+            <p:ph type="sldNum" sz="quarter" idx="10"/>
+          </p:nvPr>
+        </p:nvSpPr>
+        <p:spPr/>
+        <p:txBody>
+          <a:bodyPr/>
+          <a:lstStyle/>
+          <a:p>
+            <a:fld id="{E4B57389-7FB2-44B0-8AF4-F8530648CB92}" type="slidenum">
+              <a:rPr lang="el-GR" smtClean="0"/>
+              <a:pPr/>
+              <a:t>13</a:t>
+            </a:fld>
+            <a:endParaRPr lang="el-GR"/>
+          </a:p>
+        </p:txBody>
+      </p:sp>
+    </p:spTree>
+    <p:extLst>
+      <p:ext uri="{BB962C8B-B14F-4D97-AF65-F5344CB8AC3E}">
+        <p14:creationId xmlns:p14="http://schemas.microsoft.com/office/powerpoint/2010/main" val="2750137985"/>
+      </p:ext>
+    </p:extLst>
+  </p:cSld>
+  <p:clrMapOvr>
+    <a:masterClrMapping/>
+  </p:clrMapOvr>
+</p:notes>
+</file>
+
+<file path=ppt/notesSlides/notesSlide2.xml><?xml version="1.0" encoding="utf-8"?>
+<p:notes xmlns:a="http://schemas.openxmlformats.org/drawingml/2006/main" xmlns:r="http://schemas.openxmlformats.org/officeDocument/2006/relationships" xmlns:p="http://schemas.openxmlformats.org/presentationml/2006/main">
+  <p:cSld>
+    <p:spTree>
+      <p:nvGrpSpPr>
+        <p:cNvPr id="1" name=""/>
+        <p:cNvGrpSpPr/>
+        <p:nvPr/>
+      </p:nvGrpSpPr>
+      <p:grpSpPr>
+        <a:xfrm>
+          <a:off x="0" y="0"/>
+          <a:ext cx="0" cy="0"/>
+          <a:chOff x="0" y="0"/>
+          <a:chExt cx="0" cy="0"/>
+        </a:xfrm>
+      </p:grpSpPr>
+      <p:sp>
+        <p:nvSpPr>
+          <p:cNvPr id="2" name="Slide Image Placeholder 1"/>
+          <p:cNvSpPr>
+            <a:spLocks noGrp="1" noRot="1" noChangeAspect="1"/>
+          </p:cNvSpPr>
+          <p:nvPr>
+            <p:ph type="sldImg"/>
+          </p:nvPr>
+        </p:nvSpPr>
+        <p:spPr/>
+      </p:sp>
+      <p:sp>
+        <p:nvSpPr>
+          <p:cNvPr id="3" name="Notes Placeholder 2"/>
+          <p:cNvSpPr>
+            <a:spLocks noGrp="1"/>
+          </p:cNvSpPr>
+          <p:nvPr>
+            <p:ph type="body" idx="1"/>
+          </p:nvPr>
+        </p:nvSpPr>
+        <p:spPr/>
+        <p:txBody>
+          <a:bodyPr/>
+          <a:lstStyle/>
+          <a:p>
+            <a:r>
+              <a:rPr lang="el-GR" dirty="0" smtClean="0"/>
+              <a:t>Ξεκινάμε</a:t>
+            </a:r>
+            <a:r>
+              <a:rPr lang="el-GR" baseline="0" dirty="0" smtClean="0"/>
+              <a:t> με την εξήγηση του βασικού μαθηματικού μας μοντέλου. Ορίζουμε ένα διάνυσμα που αναπαριστά μία βασίλισσα σε κάθε στήλη. Έχοντας τους περιορισμούς γραμμής και διαγωνίων, μπορούμε άμεσα να υπολογίσουμε με αυτές τις εξισώσεις τον αριθμό συγκρούσεων.</a:t>
+            </a:r>
+            <a:endParaRPr lang="en-US" dirty="0"/>
+          </a:p>
+        </p:txBody>
+      </p:sp>
+      <p:sp>
+        <p:nvSpPr>
+          <p:cNvPr id="4" name="Slide Number Placeholder 3"/>
+          <p:cNvSpPr>
+            <a:spLocks noGrp="1"/>
+          </p:cNvSpPr>
+          <p:nvPr>
+            <p:ph type="sldNum" sz="quarter" idx="10"/>
+          </p:nvPr>
+        </p:nvSpPr>
+        <p:spPr/>
+        <p:txBody>
+          <a:bodyPr/>
+          <a:lstStyle/>
+          <a:p>
+            <a:fld id="{E4B57389-7FB2-44B0-8AF4-F8530648CB92}" type="slidenum">
+              <a:rPr lang="el-GR" smtClean="0"/>
+              <a:pPr/>
+              <a:t>3</a:t>
+            </a:fld>
+            <a:endParaRPr lang="el-GR"/>
+          </a:p>
+        </p:txBody>
+      </p:sp>
+    </p:spTree>
+    <p:extLst>
+      <p:ext uri="{BB962C8B-B14F-4D97-AF65-F5344CB8AC3E}">
+        <p14:creationId xmlns:p14="http://schemas.microsoft.com/office/powerpoint/2010/main" val="2433596100"/>
+      </p:ext>
+    </p:extLst>
+  </p:cSld>
+  <p:clrMapOvr>
+    <a:masterClrMapping/>
+  </p:clrMapOvr>
+</p:notes>
+</file>
+
+<file path=ppt/notesSlides/notesSlide3.xml><?xml version="1.0" encoding="utf-8"?>
+<p:notes xmlns:a="http://schemas.openxmlformats.org/drawingml/2006/main" xmlns:r="http://schemas.openxmlformats.org/officeDocument/2006/relationships" xmlns:p="http://schemas.openxmlformats.org/presentationml/2006/main">
+  <p:cSld>
+    <p:spTree>
+      <p:nvGrpSpPr>
+        <p:cNvPr id="1" name=""/>
+        <p:cNvGrpSpPr/>
+        <p:nvPr/>
+      </p:nvGrpSpPr>
+      <p:grpSpPr>
+        <a:xfrm>
+          <a:off x="0" y="0"/>
+          <a:ext cx="0" cy="0"/>
+          <a:chOff x="0" y="0"/>
+          <a:chExt cx="0" cy="0"/>
+        </a:xfrm>
+      </p:grpSpPr>
+      <p:sp>
+        <p:nvSpPr>
+          <p:cNvPr id="2" name="Slide Image Placeholder 1"/>
+          <p:cNvSpPr>
+            <a:spLocks noGrp="1" noRot="1" noChangeAspect="1"/>
+          </p:cNvSpPr>
+          <p:nvPr>
+            <p:ph type="sldImg"/>
+          </p:nvPr>
+        </p:nvSpPr>
+        <p:spPr/>
+      </p:sp>
+      <p:sp>
+        <p:nvSpPr>
+          <p:cNvPr id="3" name="Notes Placeholder 2"/>
+          <p:cNvSpPr>
+            <a:spLocks noGrp="1"/>
+          </p:cNvSpPr>
+          <p:nvPr>
+            <p:ph type="body" idx="1"/>
+          </p:nvPr>
+        </p:nvSpPr>
+        <p:spPr/>
+        <p:txBody>
+          <a:bodyPr/>
+          <a:lstStyle/>
+          <a:p>
+            <a:r>
+              <a:rPr lang="el-GR" dirty="0" smtClean="0"/>
+              <a:t>Όμως αυτή</a:t>
+            </a:r>
+            <a:r>
+              <a:rPr lang="el-GR" baseline="0" dirty="0" smtClean="0"/>
+              <a:t> η συνάρτηση απαιτεί </a:t>
+            </a:r>
+            <a:r>
+              <a:rPr lang="en-US" baseline="0" dirty="0" smtClean="0"/>
+              <a:t>n^2 </a:t>
+            </a:r>
+            <a:r>
+              <a:rPr lang="el-GR" baseline="0" dirty="0" smtClean="0"/>
+              <a:t>πράξεις, και επομένως δεν μας ικανοποιούσε.</a:t>
+            </a:r>
+            <a:endParaRPr lang="en-US" dirty="0"/>
+          </a:p>
+        </p:txBody>
+      </p:sp>
+      <p:sp>
+        <p:nvSpPr>
+          <p:cNvPr id="4" name="Slide Number Placeholder 3"/>
+          <p:cNvSpPr>
+            <a:spLocks noGrp="1"/>
+          </p:cNvSpPr>
+          <p:nvPr>
+            <p:ph type="sldNum" sz="quarter" idx="10"/>
+          </p:nvPr>
+        </p:nvSpPr>
+        <p:spPr/>
+        <p:txBody>
+          <a:bodyPr/>
+          <a:lstStyle/>
+          <a:p>
+            <a:fld id="{E4B57389-7FB2-44B0-8AF4-F8530648CB92}" type="slidenum">
+              <a:rPr lang="el-GR" smtClean="0"/>
+              <a:pPr/>
+              <a:t>4</a:t>
+            </a:fld>
+            <a:endParaRPr lang="el-GR"/>
+          </a:p>
+        </p:txBody>
+      </p:sp>
+    </p:spTree>
+    <p:extLst>
+      <p:ext uri="{BB962C8B-B14F-4D97-AF65-F5344CB8AC3E}">
+        <p14:creationId xmlns:p14="http://schemas.microsoft.com/office/powerpoint/2010/main" val="2325673359"/>
+      </p:ext>
+    </p:extLst>
+  </p:cSld>
+  <p:clrMapOvr>
+    <a:masterClrMapping/>
+  </p:clrMapOvr>
+</p:notes>
+</file>
+
+<file path=ppt/notesSlides/notesSlide4.xml><?xml version="1.0" encoding="utf-8"?>
+<p:notes xmlns:a="http://schemas.openxmlformats.org/drawingml/2006/main" xmlns:r="http://schemas.openxmlformats.org/officeDocument/2006/relationships" xmlns:p="http://schemas.openxmlformats.org/presentationml/2006/main">
+  <p:cSld>
+    <p:spTree>
+      <p:nvGrpSpPr>
+        <p:cNvPr id="1" name=""/>
+        <p:cNvGrpSpPr/>
+        <p:nvPr/>
+      </p:nvGrpSpPr>
+      <p:grpSpPr>
+        <a:xfrm>
+          <a:off x="0" y="0"/>
+          <a:ext cx="0" cy="0"/>
+          <a:chOff x="0" y="0"/>
+          <a:chExt cx="0" cy="0"/>
+        </a:xfrm>
+      </p:grpSpPr>
+      <p:sp>
+        <p:nvSpPr>
+          <p:cNvPr id="2" name="Slide Image Placeholder 1"/>
+          <p:cNvSpPr>
+            <a:spLocks noGrp="1" noRot="1" noChangeAspect="1"/>
+          </p:cNvSpPr>
+          <p:nvPr>
+            <p:ph type="sldImg"/>
+          </p:nvPr>
+        </p:nvSpPr>
+        <p:spPr/>
+      </p:sp>
+      <p:sp>
+        <p:nvSpPr>
+          <p:cNvPr id="3" name="Notes Placeholder 2"/>
+          <p:cNvSpPr>
+            <a:spLocks noGrp="1"/>
+          </p:cNvSpPr>
+          <p:nvPr>
+            <p:ph type="body" idx="1"/>
+          </p:nvPr>
+        </p:nvSpPr>
+        <p:spPr/>
+        <p:txBody>
+          <a:bodyPr/>
+          <a:lstStyle/>
+          <a:p>
+            <a:r>
+              <a:rPr lang="el-GR" dirty="0" smtClean="0"/>
+              <a:t>Αυτό</a:t>
+            </a:r>
+            <a:r>
+              <a:rPr lang="el-GR" baseline="0" dirty="0" smtClean="0"/>
+              <a:t> μας οδήγησε στη δημιουργία 3 επιπλέων </a:t>
+            </a:r>
+            <a:r>
+              <a:rPr lang="en-US" baseline="0" dirty="0" smtClean="0"/>
+              <a:t>arrays</a:t>
+            </a:r>
+            <a:r>
+              <a:rPr lang="el-GR" baseline="0" dirty="0" smtClean="0"/>
+              <a:t>, στα οποία αποθηκεύουμε τον αριθμό συγκρούσεων ανά γραμμή και ανά διαγώνιο.</a:t>
+            </a:r>
+            <a:endParaRPr lang="en-US" dirty="0"/>
+          </a:p>
+        </p:txBody>
+      </p:sp>
+      <p:sp>
+        <p:nvSpPr>
+          <p:cNvPr id="4" name="Slide Number Placeholder 3"/>
+          <p:cNvSpPr>
+            <a:spLocks noGrp="1"/>
+          </p:cNvSpPr>
+          <p:nvPr>
+            <p:ph type="sldNum" sz="quarter" idx="10"/>
+          </p:nvPr>
+        </p:nvSpPr>
+        <p:spPr/>
+        <p:txBody>
+          <a:bodyPr/>
+          <a:lstStyle/>
+          <a:p>
+            <a:fld id="{E4B57389-7FB2-44B0-8AF4-F8530648CB92}" type="slidenum">
+              <a:rPr lang="el-GR" smtClean="0"/>
+              <a:pPr/>
+              <a:t>5</a:t>
+            </a:fld>
+            <a:endParaRPr lang="el-GR"/>
+          </a:p>
+        </p:txBody>
+      </p:sp>
+    </p:spTree>
+    <p:extLst>
+      <p:ext uri="{BB962C8B-B14F-4D97-AF65-F5344CB8AC3E}">
+        <p14:creationId xmlns:p14="http://schemas.microsoft.com/office/powerpoint/2010/main" val="47925793"/>
+      </p:ext>
+    </p:extLst>
+  </p:cSld>
+  <p:clrMapOvr>
+    <a:masterClrMapping/>
+  </p:clrMapOvr>
+</p:notes>
+</file>
+
+<file path=ppt/notesSlides/notesSlide5.xml><?xml version="1.0" encoding="utf-8"?>
+<p:notes xmlns:a="http://schemas.openxmlformats.org/drawingml/2006/main" xmlns:r="http://schemas.openxmlformats.org/officeDocument/2006/relationships" xmlns:p="http://schemas.openxmlformats.org/presentationml/2006/main">
+  <p:cSld>
+    <p:spTree>
+      <p:nvGrpSpPr>
+        <p:cNvPr id="1" name=""/>
+        <p:cNvGrpSpPr/>
+        <p:nvPr/>
+      </p:nvGrpSpPr>
+      <p:grpSpPr>
+        <a:xfrm>
+          <a:off x="0" y="0"/>
+          <a:ext cx="0" cy="0"/>
+          <a:chOff x="0" y="0"/>
+          <a:chExt cx="0" cy="0"/>
+        </a:xfrm>
+      </p:grpSpPr>
+      <p:sp>
+        <p:nvSpPr>
+          <p:cNvPr id="2" name="Slide Image Placeholder 1"/>
+          <p:cNvSpPr>
+            <a:spLocks noGrp="1" noRot="1" noChangeAspect="1"/>
+          </p:cNvSpPr>
+          <p:nvPr>
+            <p:ph type="sldImg"/>
+          </p:nvPr>
+        </p:nvSpPr>
+        <p:spPr/>
+      </p:sp>
+      <p:sp>
+        <p:nvSpPr>
+          <p:cNvPr id="3" name="Notes Placeholder 2"/>
+          <p:cNvSpPr>
+            <a:spLocks noGrp="1"/>
+          </p:cNvSpPr>
+          <p:nvPr>
+            <p:ph type="body" idx="1"/>
+          </p:nvPr>
+        </p:nvSpPr>
+        <p:spPr/>
+        <p:txBody>
+          <a:bodyPr/>
+          <a:lstStyle/>
+          <a:p>
+            <a:r>
+              <a:rPr lang="el-GR" dirty="0" smtClean="0"/>
+              <a:t>Με αυτό</a:t>
+            </a:r>
+            <a:r>
+              <a:rPr lang="el-GR" baseline="0" dirty="0" smtClean="0"/>
+              <a:t> τον τρόπο γνωρίζουμε άμεσα ότι αν μία γραμμή ή διαγώνιος έχει </a:t>
+            </a:r>
+            <a:r>
+              <a:rPr lang="en-US" baseline="0" dirty="0" smtClean="0"/>
+              <a:t>k </a:t>
+            </a:r>
+            <a:r>
+              <a:rPr lang="el-GR" baseline="0" dirty="0" smtClean="0"/>
+              <a:t>βασίλισσες, τότε έχει και </a:t>
+            </a:r>
+            <a:r>
+              <a:rPr lang="en-US" baseline="0" dirty="0" smtClean="0"/>
+              <a:t>k-1 </a:t>
+            </a:r>
+            <a:r>
+              <a:rPr lang="el-GR" baseline="0" dirty="0" smtClean="0"/>
+              <a:t>συγκρούσεις.</a:t>
+            </a:r>
+            <a:endParaRPr lang="en-US" dirty="0"/>
+          </a:p>
+        </p:txBody>
+      </p:sp>
+      <p:sp>
+        <p:nvSpPr>
+          <p:cNvPr id="4" name="Slide Number Placeholder 3"/>
+          <p:cNvSpPr>
+            <a:spLocks noGrp="1"/>
+          </p:cNvSpPr>
+          <p:nvPr>
+            <p:ph type="sldNum" sz="quarter" idx="10"/>
+          </p:nvPr>
+        </p:nvSpPr>
+        <p:spPr/>
+        <p:txBody>
+          <a:bodyPr/>
+          <a:lstStyle/>
+          <a:p>
+            <a:fld id="{E4B57389-7FB2-44B0-8AF4-F8530648CB92}" type="slidenum">
+              <a:rPr lang="el-GR" smtClean="0"/>
+              <a:pPr/>
+              <a:t>6</a:t>
+            </a:fld>
+            <a:endParaRPr lang="el-GR"/>
+          </a:p>
+        </p:txBody>
+      </p:sp>
+    </p:spTree>
+    <p:extLst>
+      <p:ext uri="{BB962C8B-B14F-4D97-AF65-F5344CB8AC3E}">
+        <p14:creationId xmlns:p14="http://schemas.microsoft.com/office/powerpoint/2010/main" val="48284114"/>
+      </p:ext>
+    </p:extLst>
+  </p:cSld>
+  <p:clrMapOvr>
+    <a:masterClrMapping/>
+  </p:clrMapOvr>
+</p:notes>
+</file>
+
+<file path=ppt/notesSlides/notesSlide6.xml><?xml version="1.0" encoding="utf-8"?>
+<p:notes xmlns:a="http://schemas.openxmlformats.org/drawingml/2006/main" xmlns:r="http://schemas.openxmlformats.org/officeDocument/2006/relationships" xmlns:p="http://schemas.openxmlformats.org/presentationml/2006/main">
+  <p:cSld>
+    <p:spTree>
+      <p:nvGrpSpPr>
+        <p:cNvPr id="1" name=""/>
+        <p:cNvGrpSpPr/>
+        <p:nvPr/>
+      </p:nvGrpSpPr>
+      <p:grpSpPr>
+        <a:xfrm>
+          <a:off x="0" y="0"/>
+          <a:ext cx="0" cy="0"/>
+          <a:chOff x="0" y="0"/>
+          <a:chExt cx="0" cy="0"/>
+        </a:xfrm>
+      </p:grpSpPr>
+      <p:sp>
+        <p:nvSpPr>
+          <p:cNvPr id="2" name="Slide Image Placeholder 1"/>
+          <p:cNvSpPr>
+            <a:spLocks noGrp="1" noRot="1" noChangeAspect="1"/>
+          </p:cNvSpPr>
+          <p:nvPr>
+            <p:ph type="sldImg"/>
+          </p:nvPr>
+        </p:nvSpPr>
+        <p:spPr/>
+      </p:sp>
+      <p:sp>
+        <p:nvSpPr>
+          <p:cNvPr id="3" name="Notes Placeholder 2"/>
+          <p:cNvSpPr>
+            <a:spLocks noGrp="1"/>
+          </p:cNvSpPr>
+          <p:nvPr>
+            <p:ph type="body" idx="1"/>
+          </p:nvPr>
+        </p:nvSpPr>
+        <p:spPr/>
+        <p:txBody>
+          <a:bodyPr/>
+          <a:lstStyle/>
+          <a:p>
+            <a:r>
+              <a:rPr lang="el-GR" dirty="0" smtClean="0"/>
+              <a:t>Περνώντας</a:t>
+            </a:r>
+            <a:r>
+              <a:rPr lang="el-GR" baseline="0" dirty="0" smtClean="0"/>
+              <a:t> τώρα στις μεθόδους που υλοποίησαμε, πρώτα ξεκινήσαμε με μία μέθοδο </a:t>
+            </a:r>
+            <a:r>
+              <a:rPr lang="en-US" baseline="0" smtClean="0"/>
+              <a:t>CSP </a:t>
+            </a:r>
+            <a:r>
+              <a:rPr lang="el-GR" baseline="0" smtClean="0"/>
+              <a:t>όπως </a:t>
+            </a:r>
+            <a:r>
+              <a:rPr lang="el-GR" baseline="0" dirty="0" smtClean="0"/>
+              <a:t>την είδαμε στις διαλέξεις, και συγκεκριμένα την </a:t>
+            </a:r>
+            <a:r>
+              <a:rPr lang="en-US" baseline="0" dirty="0" smtClean="0"/>
+              <a:t>Forward Checking </a:t>
+            </a:r>
+            <a:r>
+              <a:rPr lang="el-GR" baseline="0" dirty="0" smtClean="0"/>
+              <a:t>με </a:t>
+            </a:r>
+            <a:r>
+              <a:rPr lang="en-US" baseline="0" dirty="0" smtClean="0"/>
+              <a:t>MRV heuristic.</a:t>
+            </a:r>
+            <a:endParaRPr lang="en-US" dirty="0"/>
+          </a:p>
+        </p:txBody>
+      </p:sp>
+      <p:sp>
+        <p:nvSpPr>
+          <p:cNvPr id="4" name="Slide Number Placeholder 3"/>
+          <p:cNvSpPr>
+            <a:spLocks noGrp="1"/>
+          </p:cNvSpPr>
+          <p:nvPr>
+            <p:ph type="sldNum" sz="quarter" idx="10"/>
+          </p:nvPr>
+        </p:nvSpPr>
+        <p:spPr/>
+        <p:txBody>
+          <a:bodyPr/>
+          <a:lstStyle/>
+          <a:p>
+            <a:fld id="{E4B57389-7FB2-44B0-8AF4-F8530648CB92}" type="slidenum">
+              <a:rPr lang="el-GR" smtClean="0"/>
+              <a:pPr/>
+              <a:t>7</a:t>
+            </a:fld>
+            <a:endParaRPr lang="el-GR"/>
+          </a:p>
+        </p:txBody>
+      </p:sp>
+    </p:spTree>
+    <p:extLst>
+      <p:ext uri="{BB962C8B-B14F-4D97-AF65-F5344CB8AC3E}">
+        <p14:creationId xmlns:p14="http://schemas.microsoft.com/office/powerpoint/2010/main" val="3657438385"/>
+      </p:ext>
+    </p:extLst>
+  </p:cSld>
+  <p:clrMapOvr>
+    <a:masterClrMapping/>
+  </p:clrMapOvr>
+</p:notes>
+</file>
+
+<file path=ppt/notesSlides/notesSlide7.xml><?xml version="1.0" encoding="utf-8"?>
+<p:notes xmlns:a="http://schemas.openxmlformats.org/drawingml/2006/main" xmlns:r="http://schemas.openxmlformats.org/officeDocument/2006/relationships" xmlns:p="http://schemas.openxmlformats.org/presentationml/2006/main">
+  <p:cSld>
+    <p:spTree>
+      <p:nvGrpSpPr>
+        <p:cNvPr id="1" name=""/>
+        <p:cNvGrpSpPr/>
+        <p:nvPr/>
+      </p:nvGrpSpPr>
+      <p:grpSpPr>
+        <a:xfrm>
+          <a:off x="0" y="0"/>
+          <a:ext cx="0" cy="0"/>
+          <a:chOff x="0" y="0"/>
+          <a:chExt cx="0" cy="0"/>
+        </a:xfrm>
+      </p:grpSpPr>
+      <p:sp>
+        <p:nvSpPr>
+          <p:cNvPr id="2" name="Slide Image Placeholder 1"/>
+          <p:cNvSpPr>
+            <a:spLocks noGrp="1" noRot="1" noChangeAspect="1"/>
+          </p:cNvSpPr>
+          <p:nvPr>
+            <p:ph type="sldImg"/>
+          </p:nvPr>
+        </p:nvSpPr>
+        <p:spPr/>
+      </p:sp>
+      <p:sp>
+        <p:nvSpPr>
+          <p:cNvPr id="3" name="Notes Placeholder 2"/>
+          <p:cNvSpPr>
+            <a:spLocks noGrp="1"/>
+          </p:cNvSpPr>
+          <p:nvPr>
+            <p:ph type="body" idx="1"/>
+          </p:nvPr>
+        </p:nvSpPr>
+        <p:spPr/>
+        <p:txBody>
+          <a:bodyPr/>
+          <a:lstStyle/>
+          <a:p>
+            <a:r>
+              <a:rPr lang="el-GR" dirty="0" smtClean="0"/>
+              <a:t>Επίσης</a:t>
+            </a:r>
+            <a:r>
+              <a:rPr lang="el-GR" baseline="0" dirty="0" smtClean="0"/>
+              <a:t> ως μέθοδο τοπικής αναζήτησης υλοποιήσαμε την </a:t>
+            </a:r>
+            <a:r>
+              <a:rPr lang="en-US" baseline="0" dirty="0" smtClean="0"/>
+              <a:t>min-conflicts</a:t>
+            </a:r>
+            <a:r>
+              <a:rPr lang="el-GR" baseline="0" dirty="0" smtClean="0"/>
+              <a:t>, και αυτή όπως την διδαχθήκαμε στο μάθημα. Επειδή όμως θέλαμε να δούμε και μία ακόμη πιο βελτιωμένη μέθοδο....</a:t>
+            </a:r>
+            <a:endParaRPr lang="en-US" dirty="0"/>
+          </a:p>
+        </p:txBody>
+      </p:sp>
+      <p:sp>
+        <p:nvSpPr>
+          <p:cNvPr id="4" name="Slide Number Placeholder 3"/>
+          <p:cNvSpPr>
+            <a:spLocks noGrp="1"/>
+          </p:cNvSpPr>
+          <p:nvPr>
+            <p:ph type="sldNum" sz="quarter" idx="10"/>
+          </p:nvPr>
+        </p:nvSpPr>
+        <p:spPr/>
+        <p:txBody>
+          <a:bodyPr/>
+          <a:lstStyle/>
+          <a:p>
+            <a:fld id="{E4B57389-7FB2-44B0-8AF4-F8530648CB92}" type="slidenum">
+              <a:rPr lang="el-GR" smtClean="0"/>
+              <a:pPr/>
+              <a:t>8</a:t>
+            </a:fld>
+            <a:endParaRPr lang="el-GR"/>
+          </a:p>
+        </p:txBody>
+      </p:sp>
+    </p:spTree>
+    <p:extLst>
+      <p:ext uri="{BB962C8B-B14F-4D97-AF65-F5344CB8AC3E}">
+        <p14:creationId xmlns:p14="http://schemas.microsoft.com/office/powerpoint/2010/main" val="1383564782"/>
+      </p:ext>
+    </p:extLst>
+  </p:cSld>
+  <p:clrMapOvr>
+    <a:masterClrMapping/>
+  </p:clrMapOvr>
+</p:notes>
+</file>
+
+<file path=ppt/notesSlides/notesSlide8.xml><?xml version="1.0" encoding="utf-8"?>
+<p:notes xmlns:a="http://schemas.openxmlformats.org/drawingml/2006/main" xmlns:r="http://schemas.openxmlformats.org/officeDocument/2006/relationships" xmlns:p="http://schemas.openxmlformats.org/presentationml/2006/main">
+  <p:cSld>
+    <p:spTree>
+      <p:nvGrpSpPr>
+        <p:cNvPr id="1" name=""/>
+        <p:cNvGrpSpPr/>
+        <p:nvPr/>
+      </p:nvGrpSpPr>
+      <p:grpSpPr>
+        <a:xfrm>
+          <a:off x="0" y="0"/>
+          <a:ext cx="0" cy="0"/>
+          <a:chOff x="0" y="0"/>
+          <a:chExt cx="0" cy="0"/>
+        </a:xfrm>
+      </p:grpSpPr>
+      <p:sp>
+        <p:nvSpPr>
+          <p:cNvPr id="2" name="Slide Image Placeholder 1"/>
+          <p:cNvSpPr>
+            <a:spLocks noGrp="1" noRot="1" noChangeAspect="1"/>
+          </p:cNvSpPr>
+          <p:nvPr>
+            <p:ph type="sldImg"/>
+          </p:nvPr>
+        </p:nvSpPr>
+        <p:spPr/>
+      </p:sp>
+      <p:sp>
+        <p:nvSpPr>
+          <p:cNvPr id="3" name="Notes Placeholder 2"/>
+          <p:cNvSpPr>
+            <a:spLocks noGrp="1"/>
+          </p:cNvSpPr>
+          <p:nvPr>
+            <p:ph type="body" idx="1"/>
+          </p:nvPr>
+        </p:nvSpPr>
+        <p:spPr/>
+        <p:txBody>
+          <a:bodyPr/>
+          <a:lstStyle/>
+          <a:p>
+            <a:r>
+              <a:rPr lang="el-GR" dirty="0" smtClean="0"/>
+              <a:t>Από τη βιβλιογραφία</a:t>
+            </a:r>
+            <a:r>
+              <a:rPr lang="el-GR" baseline="0" dirty="0" smtClean="0"/>
+              <a:t> επιλέξαμε και τρίτο αλγόριθμο, τον </a:t>
+            </a:r>
+            <a:r>
+              <a:rPr lang="en-US" baseline="0" dirty="0" smtClean="0"/>
+              <a:t>Queen Search 2</a:t>
+            </a:r>
+            <a:r>
+              <a:rPr lang="el-GR" baseline="0" dirty="0" smtClean="0"/>
+              <a:t>, ο οποίος αλλάζει την συνάρτηση διαδόχων του </a:t>
+            </a:r>
+            <a:r>
+              <a:rPr lang="en-US" baseline="0" dirty="0" smtClean="0"/>
+              <a:t>min-conflicts</a:t>
+            </a:r>
+            <a:r>
+              <a:rPr lang="el-GR" baseline="0" dirty="0" smtClean="0"/>
+              <a:t> ώστε σε κάθε βήμα οι βασίλισσες να απειλούνται μόνο από τις διαγωνίους.</a:t>
+            </a:r>
+            <a:endParaRPr lang="en-US" dirty="0"/>
+          </a:p>
+        </p:txBody>
+      </p:sp>
+      <p:sp>
+        <p:nvSpPr>
+          <p:cNvPr id="4" name="Slide Number Placeholder 3"/>
+          <p:cNvSpPr>
+            <a:spLocks noGrp="1"/>
+          </p:cNvSpPr>
+          <p:nvPr>
+            <p:ph type="sldNum" sz="quarter" idx="10"/>
+          </p:nvPr>
+        </p:nvSpPr>
+        <p:spPr/>
+        <p:txBody>
+          <a:bodyPr/>
+          <a:lstStyle/>
+          <a:p>
+            <a:fld id="{E4B57389-7FB2-44B0-8AF4-F8530648CB92}" type="slidenum">
+              <a:rPr lang="el-GR" smtClean="0"/>
+              <a:pPr/>
+              <a:t>9</a:t>
+            </a:fld>
+            <a:endParaRPr lang="el-GR"/>
+          </a:p>
+        </p:txBody>
+      </p:sp>
+    </p:spTree>
+    <p:extLst>
+      <p:ext uri="{BB962C8B-B14F-4D97-AF65-F5344CB8AC3E}">
+        <p14:creationId xmlns:p14="http://schemas.microsoft.com/office/powerpoint/2010/main" val="1276004972"/>
+      </p:ext>
+    </p:extLst>
+  </p:cSld>
+  <p:clrMapOvr>
+    <a:masterClrMapping/>
+  </p:clrMapOvr>
+</p:notes>
+</file>
+
+<file path=ppt/notesSlides/notesSlide9.xml><?xml version="1.0" encoding="utf-8"?>
+<p:notes xmlns:a="http://schemas.openxmlformats.org/drawingml/2006/main" xmlns:r="http://schemas.openxmlformats.org/officeDocument/2006/relationships" xmlns:p="http://schemas.openxmlformats.org/presentationml/2006/main">
+  <p:cSld>
+    <p:spTree>
+      <p:nvGrpSpPr>
+        <p:cNvPr id="1" name=""/>
+        <p:cNvGrpSpPr/>
+        <p:nvPr/>
+      </p:nvGrpSpPr>
+      <p:grpSpPr>
+        <a:xfrm>
+          <a:off x="0" y="0"/>
+          <a:ext cx="0" cy="0"/>
+          <a:chOff x="0" y="0"/>
+          <a:chExt cx="0" cy="0"/>
+        </a:xfrm>
+      </p:grpSpPr>
+      <p:sp>
+        <p:nvSpPr>
+          <p:cNvPr id="2" name="Slide Image Placeholder 1"/>
+          <p:cNvSpPr>
+            <a:spLocks noGrp="1" noRot="1" noChangeAspect="1"/>
+          </p:cNvSpPr>
+          <p:nvPr>
+            <p:ph type="sldImg"/>
+          </p:nvPr>
+        </p:nvSpPr>
+        <p:spPr/>
+      </p:sp>
+      <p:sp>
+        <p:nvSpPr>
+          <p:cNvPr id="3" name="Notes Placeholder 2"/>
+          <p:cNvSpPr>
+            <a:spLocks noGrp="1"/>
+          </p:cNvSpPr>
+          <p:nvPr>
+            <p:ph type="body" idx="1"/>
+          </p:nvPr>
+        </p:nvSpPr>
+        <p:spPr/>
+        <p:txBody>
+          <a:bodyPr/>
+          <a:lstStyle/>
+          <a:p>
+            <a:r>
+              <a:rPr lang="el-GR" dirty="0" smtClean="0"/>
+              <a:t>Αρχικά συγκρίνουμε</a:t>
+            </a:r>
+            <a:r>
+              <a:rPr lang="el-GR" baseline="0" dirty="0" smtClean="0"/>
+              <a:t> το μέσο χρόνο εκτέλεσης για 100 επαναλήψεις των αλγορίθμων μας. Παρατηρούμε ότι για μικρά </a:t>
+            </a:r>
+            <a:r>
+              <a:rPr lang="en-US" baseline="0" dirty="0" smtClean="0"/>
+              <a:t>n </a:t>
+            </a:r>
+            <a:r>
+              <a:rPr lang="el-GR" baseline="0" dirty="0" smtClean="0"/>
+              <a:t>ο </a:t>
+            </a:r>
+            <a:r>
+              <a:rPr lang="en-US" baseline="0" dirty="0" smtClean="0"/>
+              <a:t>FC-MRV </a:t>
+            </a:r>
+            <a:r>
+              <a:rPr lang="el-GR" baseline="0" dirty="0" smtClean="0"/>
+              <a:t>και ο </a:t>
+            </a:r>
+            <a:r>
+              <a:rPr lang="en-US" baseline="0" dirty="0" smtClean="0"/>
+              <a:t>min-conflicts </a:t>
+            </a:r>
+            <a:r>
+              <a:rPr lang="el-GR" baseline="0" dirty="0" smtClean="0"/>
+              <a:t>αποδίδουν καλύτερα, αλλά σε μεγάλα </a:t>
+            </a:r>
+            <a:r>
+              <a:rPr lang="en-US" baseline="0" dirty="0" smtClean="0"/>
+              <a:t>n </a:t>
+            </a:r>
+            <a:r>
+              <a:rPr lang="el-GR" baseline="0" dirty="0" smtClean="0"/>
+              <a:t>ξεκάθαρα υπερτερεί ο </a:t>
+            </a:r>
+            <a:r>
+              <a:rPr lang="en-US" baseline="0" dirty="0" smtClean="0"/>
+              <a:t>QS2. </a:t>
+            </a:r>
+            <a:r>
+              <a:rPr lang="el-GR" baseline="0" dirty="0" smtClean="0"/>
+              <a:t>Εμπειρικά  το σχήμα δείχνει ότι ο </a:t>
+            </a:r>
+            <a:r>
+              <a:rPr lang="en-US" baseline="0" dirty="0" smtClean="0"/>
+              <a:t>FC-MRV </a:t>
+            </a:r>
+            <a:r>
+              <a:rPr lang="el-GR" baseline="0" dirty="0" smtClean="0"/>
+              <a:t>έχει αναμενόμενα εκθετική πολυπλοκότητα, ενώ ο χρόνος των αλγορίθμων τοπικής αναζήτησης αυξάνεται πολυωνυμικά.</a:t>
+            </a:r>
+            <a:endParaRPr lang="en-US" dirty="0"/>
+          </a:p>
+        </p:txBody>
+      </p:sp>
+      <p:sp>
+        <p:nvSpPr>
+          <p:cNvPr id="4" name="Slide Number Placeholder 3"/>
+          <p:cNvSpPr>
+            <a:spLocks noGrp="1"/>
+          </p:cNvSpPr>
+          <p:nvPr>
+            <p:ph type="sldNum" sz="quarter" idx="10"/>
+          </p:nvPr>
+        </p:nvSpPr>
+        <p:spPr/>
+        <p:txBody>
+          <a:bodyPr/>
+          <a:lstStyle/>
+          <a:p>
+            <a:fld id="{E4B57389-7FB2-44B0-8AF4-F8530648CB92}" type="slidenum">
+              <a:rPr lang="el-GR" smtClean="0"/>
+              <a:pPr/>
+              <a:t>11</a:t>
+            </a:fld>
+            <a:endParaRPr lang="el-GR"/>
+          </a:p>
+        </p:txBody>
+      </p:sp>
+    </p:spTree>
+    <p:extLst>
+      <p:ext uri="{BB962C8B-B14F-4D97-AF65-F5344CB8AC3E}">
+        <p14:creationId xmlns:p14="http://schemas.microsoft.com/office/powerpoint/2010/main" val="399224959"/>
       </p:ext>
     </p:extLst>
   </p:cSld>
@@ -4508,17 +5601,7 @@
                 <a:latin typeface="Arial" pitchFamily="34" charset="0"/>
                 <a:cs typeface="Arial" pitchFamily="34" charset="0"/>
               </a:rPr>
-              <a:t> </a:t>
-            </a:r>
-            <a:r>
-              <a:rPr lang="el-GR" sz="2900" dirty="0" smtClean="0">
-                <a:solidFill>
-                  <a:schemeClr val="tx1"/>
-                </a:solidFill>
-                <a:latin typeface="Arial" pitchFamily="34" charset="0"/>
-                <a:cs typeface="Arial" pitchFamily="34" charset="0"/>
-              </a:rPr>
-              <a:t>Ιουνίου 2018</a:t>
+              <a:t> Ιουνίου 2018</a:t>
             </a:r>
             <a:endParaRPr lang="en-US" sz="2900" dirty="0" smtClean="0">
               <a:solidFill>
@@ -4809,7 +5892,7 @@
           <p:nvPr/>
         </p:nvPicPr>
         <p:blipFill>
-          <a:blip r:embed="rId2"/>
+          <a:blip r:embed="rId3"/>
           <a:stretch>
             <a:fillRect/>
           </a:stretch>
@@ -4932,7 +6015,7 @@
           <p:nvPr/>
         </p:nvPicPr>
         <p:blipFill>
-          <a:blip r:embed="rId2"/>
+          <a:blip r:embed="rId3"/>
           <a:stretch>
             <a:fillRect/>
           </a:stretch>
@@ -5305,7 +6388,7 @@
 </file>
 
 <file path=ppt/slides/slide2.xml><?xml version="1.0" encoding="utf-8"?>
-<p:sld xmlns:a="http://schemas.openxmlformats.org/drawingml/2006/main" xmlns:r="http://schemas.openxmlformats.org/officeDocument/2006/relationships" xmlns:p="http://schemas.openxmlformats.org/presentationml/2006/main">
+<p:sld xmlns:a="http://schemas.openxmlformats.org/drawingml/2006/main" xmlns:r="http://schemas.openxmlformats.org/officeDocument/2006/relationships" xmlns:p="http://schemas.openxmlformats.org/presentationml/2006/main" show="0">
   <p:cSld>
     <p:spTree>
       <p:nvGrpSpPr>
@@ -5472,6 +6555,14 @@
   <p:clrMapOvr>
     <a:masterClrMapping/>
   </p:clrMapOvr>
+  <mc:AlternateContent xmlns:mc="http://schemas.openxmlformats.org/markup-compatibility/2006">
+    <mc:Choice xmlns:p14="http://schemas.microsoft.com/office/powerpoint/2010/main" Requires="p14">
+      <p:transition spd="slow" p14:dur="2000"/>
+    </mc:Choice>
+    <mc:Fallback>
+      <p:transition spd="slow"/>
+    </mc:Fallback>
+  </mc:AlternateContent>
   <p:timing>
     <p:tnLst>
       <p:par>
@@ -5618,7 +6709,7 @@
           <p:nvPr/>
         </p:nvPicPr>
         <p:blipFill>
-          <a:blip r:embed="rId2"/>
+          <a:blip r:embed="rId3"/>
           <a:stretch>
             <a:fillRect/>
           </a:stretch>
@@ -5642,7 +6733,7 @@
           <p:nvPr/>
         </p:nvPicPr>
         <p:blipFill>
-          <a:blip r:embed="rId3"/>
+          <a:blip r:embed="rId4"/>
           <a:stretch>
             <a:fillRect/>
           </a:stretch>
@@ -5666,7 +6757,7 @@
           <p:nvPr/>
         </p:nvPicPr>
         <p:blipFill>
-          <a:blip r:embed="rId4"/>
+          <a:blip r:embed="rId5"/>
           <a:stretch>
             <a:fillRect/>
           </a:stretch>
@@ -5837,7 +6928,7 @@
           <p:nvPr/>
         </p:nvPicPr>
         <p:blipFill>
-          <a:blip r:embed="rId2"/>
+          <a:blip r:embed="rId3"/>
           <a:stretch>
             <a:fillRect/>
           </a:stretch>
@@ -5861,7 +6952,7 @@
           <p:nvPr/>
         </p:nvPicPr>
         <p:blipFill>
-          <a:blip r:embed="rId3"/>
+          <a:blip r:embed="rId4"/>
           <a:stretch>
             <a:fillRect/>
           </a:stretch>
@@ -5885,7 +6976,7 @@
           <p:nvPr/>
         </p:nvPicPr>
         <p:blipFill>
-          <a:blip r:embed="rId4"/>
+          <a:blip r:embed="rId5"/>
           <a:stretch>
             <a:fillRect/>
           </a:stretch>
@@ -6118,7 +7209,7 @@
           <p:nvPr/>
         </p:nvPicPr>
         <p:blipFill>
-          <a:blip r:embed="rId2"/>
+          <a:blip r:embed="rId3"/>
           <a:stretch>
             <a:fillRect/>
           </a:stretch>
@@ -6214,7 +7305,7 @@
           <p:nvPr/>
         </p:nvPicPr>
         <p:blipFill>
-          <a:blip r:embed="rId3"/>
+          <a:blip r:embed="rId4"/>
           <a:stretch>
             <a:fillRect/>
           </a:stretch>
@@ -6238,7 +7329,7 @@
           <p:nvPr/>
         </p:nvPicPr>
         <p:blipFill>
-          <a:blip r:embed="rId4"/>
+          <a:blip r:embed="rId5"/>
           <a:stretch>
             <a:fillRect/>
           </a:stretch>
@@ -6262,7 +7353,7 @@
           <p:nvPr/>
         </p:nvPicPr>
         <p:blipFill>
-          <a:blip r:embed="rId5"/>
+          <a:blip r:embed="rId6"/>
           <a:stretch>
             <a:fillRect/>
           </a:stretch>
@@ -6385,7 +7476,7 @@
           <p:nvPr/>
         </p:nvPicPr>
         <p:blipFill>
-          <a:blip r:embed="rId2"/>
+          <a:blip r:embed="rId3"/>
           <a:stretch>
             <a:fillRect/>
           </a:stretch>
@@ -6481,7 +7572,7 @@
           <p:nvPr/>
         </p:nvPicPr>
         <p:blipFill>
-          <a:blip r:embed="rId3"/>
+          <a:blip r:embed="rId4"/>
           <a:stretch>
             <a:fillRect/>
           </a:stretch>
@@ -6505,7 +7596,7 @@
           <p:nvPr/>
         </p:nvPicPr>
         <p:blipFill>
-          <a:blip r:embed="rId4"/>
+          <a:blip r:embed="rId5"/>
           <a:stretch>
             <a:fillRect/>
           </a:stretch>
@@ -6529,7 +7620,7 @@
           <p:nvPr/>
         </p:nvPicPr>
         <p:blipFill>
-          <a:blip r:embed="rId5"/>
+          <a:blip r:embed="rId6"/>
           <a:stretch>
             <a:fillRect/>
           </a:stretch>
@@ -6553,7 +7644,7 @@
           <p:nvPr/>
         </p:nvPicPr>
         <p:blipFill>
-          <a:blip r:embed="rId6"/>
+          <a:blip r:embed="rId7"/>
           <a:stretch>
             <a:fillRect/>
           </a:stretch>
@@ -6810,7 +7901,7 @@
           <p:nvPr/>
         </p:nvPicPr>
         <p:blipFill>
-          <a:blip r:embed="rId2"/>
+          <a:blip r:embed="rId3"/>
           <a:stretch>
             <a:fillRect/>
           </a:stretch>
@@ -7393,7 +8484,7 @@
           <p:nvPr/>
         </p:nvPicPr>
         <p:blipFill>
-          <a:blip r:embed="rId2"/>
+          <a:blip r:embed="rId3"/>
           <a:stretch>
             <a:fillRect/>
           </a:stretch>
@@ -7697,7 +8788,7 @@
           <p:nvPr/>
         </p:nvPicPr>
         <p:blipFill>
-          <a:blip r:embed="rId2"/>
+          <a:blip r:embed="rId3"/>
           <a:stretch>
             <a:fillRect/>
           </a:stretch>
@@ -7791,7 +8882,7 @@
           <p:nvPr/>
         </p:nvPicPr>
         <p:blipFill>
-          <a:blip r:embed="rId3"/>
+          <a:blip r:embed="rId4"/>
           <a:stretch>
             <a:fillRect/>
           </a:stretch>

</xml_diff>